<commit_message>
Added another version to experiment 7
</commit_message>
<xml_diff>
--- a/Active_Learning_Exercise.pptx
+++ b/Active_Learning_Exercise.pptx
@@ -253,7 +253,7 @@
           <a:p>
             <a:fld id="{D08AF926-A620-428E-8B2D-ED314B36315B}" type="datetimeFigureOut">
               <a:rPr lang="en-US" smtClean="0"/>
-              <a:t>9/23/2016</a:t>
+              <a:t>9/24/2016</a:t>
             </a:fld>
             <a:endParaRPr lang="en-US"/>
           </a:p>
@@ -423,7 +423,7 @@
           <a:p>
             <a:fld id="{D08AF926-A620-428E-8B2D-ED314B36315B}" type="datetimeFigureOut">
               <a:rPr lang="en-US" smtClean="0"/>
-              <a:t>9/23/2016</a:t>
+              <a:t>9/24/2016</a:t>
             </a:fld>
             <a:endParaRPr lang="en-US"/>
           </a:p>
@@ -603,7 +603,7 @@
           <a:p>
             <a:fld id="{D08AF926-A620-428E-8B2D-ED314B36315B}" type="datetimeFigureOut">
               <a:rPr lang="en-US" smtClean="0"/>
-              <a:t>9/23/2016</a:t>
+              <a:t>9/24/2016</a:t>
             </a:fld>
             <a:endParaRPr lang="en-US"/>
           </a:p>
@@ -773,7 +773,7 @@
           <a:p>
             <a:fld id="{D08AF926-A620-428E-8B2D-ED314B36315B}" type="datetimeFigureOut">
               <a:rPr lang="en-US" smtClean="0"/>
-              <a:t>9/23/2016</a:t>
+              <a:t>9/24/2016</a:t>
             </a:fld>
             <a:endParaRPr lang="en-US"/>
           </a:p>
@@ -1019,7 +1019,7 @@
           <a:p>
             <a:fld id="{D08AF926-A620-428E-8B2D-ED314B36315B}" type="datetimeFigureOut">
               <a:rPr lang="en-US" smtClean="0"/>
-              <a:t>9/23/2016</a:t>
+              <a:t>9/24/2016</a:t>
             </a:fld>
             <a:endParaRPr lang="en-US"/>
           </a:p>
@@ -1251,7 +1251,7 @@
           <a:p>
             <a:fld id="{D08AF926-A620-428E-8B2D-ED314B36315B}" type="datetimeFigureOut">
               <a:rPr lang="en-US" smtClean="0"/>
-              <a:t>9/23/2016</a:t>
+              <a:t>9/24/2016</a:t>
             </a:fld>
             <a:endParaRPr lang="en-US"/>
           </a:p>
@@ -1618,7 +1618,7 @@
           <a:p>
             <a:fld id="{D08AF926-A620-428E-8B2D-ED314B36315B}" type="datetimeFigureOut">
               <a:rPr lang="en-US" smtClean="0"/>
-              <a:t>9/23/2016</a:t>
+              <a:t>9/24/2016</a:t>
             </a:fld>
             <a:endParaRPr lang="en-US"/>
           </a:p>
@@ -1736,7 +1736,7 @@
           <a:p>
             <a:fld id="{D08AF926-A620-428E-8B2D-ED314B36315B}" type="datetimeFigureOut">
               <a:rPr lang="en-US" smtClean="0"/>
-              <a:t>9/23/2016</a:t>
+              <a:t>9/24/2016</a:t>
             </a:fld>
             <a:endParaRPr lang="en-US"/>
           </a:p>
@@ -1831,7 +1831,7 @@
           <a:p>
             <a:fld id="{D08AF926-A620-428E-8B2D-ED314B36315B}" type="datetimeFigureOut">
               <a:rPr lang="en-US" smtClean="0"/>
-              <a:t>9/23/2016</a:t>
+              <a:t>9/24/2016</a:t>
             </a:fld>
             <a:endParaRPr lang="en-US"/>
           </a:p>
@@ -2108,7 +2108,7 @@
           <a:p>
             <a:fld id="{D08AF926-A620-428E-8B2D-ED314B36315B}" type="datetimeFigureOut">
               <a:rPr lang="en-US" smtClean="0"/>
-              <a:t>9/23/2016</a:t>
+              <a:t>9/24/2016</a:t>
             </a:fld>
             <a:endParaRPr lang="en-US"/>
           </a:p>
@@ -2361,7 +2361,7 @@
           <a:p>
             <a:fld id="{D08AF926-A620-428E-8B2D-ED314B36315B}" type="datetimeFigureOut">
               <a:rPr lang="en-US" smtClean="0"/>
-              <a:t>9/23/2016</a:t>
+              <a:t>9/24/2016</a:t>
             </a:fld>
             <a:endParaRPr lang="en-US"/>
           </a:p>
@@ -2574,7 +2574,7 @@
           <a:p>
             <a:fld id="{D08AF926-A620-428E-8B2D-ED314B36315B}" type="datetimeFigureOut">
               <a:rPr lang="en-US" smtClean="0"/>
-              <a:t>9/23/2016</a:t>
+              <a:t>9/24/2016</a:t>
             </a:fld>
             <a:endParaRPr lang="en-US"/>
           </a:p>
@@ -4907,11 +4907,88 @@
             </a:r>
             <a:r>
               <a:rPr lang="en-US" dirty="0" smtClean="0"/>
-              <a:t>models, </a:t>
+              <a:t>models</a:t>
+            </a:r>
+            <a:r>
+              <a:rPr lang="en-US" sz="4000" dirty="0" smtClean="0"/>
+              <a:t> + </a:t>
             </a:r>
             <a:r>
               <a:rPr lang="en-US" dirty="0" smtClean="0"/>
               <a:t>bagging</a:t>
+            </a:r>
+            <a:endParaRPr lang="en-US" dirty="0"/>
+          </a:p>
+        </p:txBody>
+      </p:sp>
+      <p:sp>
+        <p:nvSpPr>
+          <p:cNvPr id="7" name="Rectangle 6"/>
+          <p:cNvSpPr/>
+          <p:nvPr/>
+        </p:nvSpPr>
+        <p:spPr>
+          <a:xfrm>
+            <a:off x="535775" y="6178726"/>
+            <a:ext cx="8892499" cy="369332"/>
+          </a:xfrm>
+          <a:prstGeom prst="rect">
+            <a:avLst/>
+          </a:prstGeom>
+        </p:spPr>
+        <p:txBody>
+          <a:bodyPr wrap="none">
+            <a:spAutoFit/>
+          </a:bodyPr>
+          <a:lstStyle/>
+          <a:p>
+            <a:r>
+              <a:rPr lang="en-US" dirty="0" err="1" smtClean="0"/>
+              <a:t>initSampleSize</a:t>
+            </a:r>
+            <a:r>
+              <a:rPr lang="en-US" dirty="0" smtClean="0"/>
+              <a:t> </a:t>
+            </a:r>
+            <a:r>
+              <a:rPr lang="en-US" dirty="0"/>
+              <a:t>= </a:t>
+            </a:r>
+            <a:r>
+              <a:rPr lang="en-US" dirty="0" smtClean="0"/>
+              <a:t>100</a:t>
+            </a:r>
+            <a:r>
+              <a:rPr lang="en-US" dirty="0"/>
+              <a:t>, </a:t>
+            </a:r>
+            <a:r>
+              <a:rPr lang="en-US" dirty="0" err="1"/>
+              <a:t>querySize</a:t>
+            </a:r>
+            <a:r>
+              <a:rPr lang="en-US" dirty="0"/>
+              <a:t> = 10, </a:t>
+            </a:r>
+            <a:r>
+              <a:rPr lang="en-US" dirty="0" smtClean="0"/>
+              <a:t>uncertainty = </a:t>
+            </a:r>
+            <a:r>
+              <a:rPr lang="en-US" dirty="0" err="1" smtClean="0"/>
+              <a:t>voteEntropy</a:t>
+            </a:r>
+            <a:r>
+              <a:rPr lang="en-US" dirty="0" smtClean="0"/>
+              <a:t>, </a:t>
+            </a:r>
+            <a:r>
+              <a:rPr lang="en-US" dirty="0" err="1" smtClean="0"/>
+              <a:t>finalModel</a:t>
+            </a:r>
+            <a:r>
+              <a:rPr lang="en-US" dirty="0" smtClean="0"/>
+              <a:t> = Random Forests</a:t>
             </a:r>
             <a:endParaRPr lang="en-US" dirty="0"/>
           </a:p>
@@ -4919,7 +4996,7 @@
       </p:sp>
       <p:pic>
         <p:nvPicPr>
-          <p:cNvPr id="4" name="Picture 3"/>
+          <p:cNvPr id="3" name="Picture 2"/>
           <p:cNvPicPr>
             <a:picLocks noChangeAspect="1"/>
           </p:cNvPicPr>
@@ -4939,7 +5016,7 @@
         </p:blipFill>
         <p:spPr>
           <a:xfrm>
-            <a:off x="3810000" y="1442257"/>
+            <a:off x="3810000" y="1442258"/>
             <a:ext cx="4572000" cy="4572000"/>
           </a:xfrm>
           <a:prstGeom prst="rect">
@@ -4977,79 +5054,6 @@
           </a:sp3d>
         </p:spPr>
       </p:pic>
-      <p:sp>
-        <p:nvSpPr>
-          <p:cNvPr id="7" name="Rectangle 6"/>
-          <p:cNvSpPr/>
-          <p:nvPr/>
-        </p:nvSpPr>
-        <p:spPr>
-          <a:xfrm>
-            <a:off x="535775" y="6178726"/>
-            <a:ext cx="8892499" cy="369332"/>
-          </a:xfrm>
-          <a:prstGeom prst="rect">
-            <a:avLst/>
-          </a:prstGeom>
-        </p:spPr>
-        <p:txBody>
-          <a:bodyPr wrap="none">
-            <a:spAutoFit/>
-          </a:bodyPr>
-          <a:lstStyle/>
-          <a:p>
-            <a:r>
-              <a:rPr lang="en-US" dirty="0" err="1" smtClean="0"/>
-              <a:t>initSampleSize</a:t>
-            </a:r>
-            <a:r>
-              <a:rPr lang="en-US" dirty="0" smtClean="0"/>
-              <a:t> </a:t>
-            </a:r>
-            <a:r>
-              <a:rPr lang="en-US" dirty="0"/>
-              <a:t>= </a:t>
-            </a:r>
-            <a:r>
-              <a:rPr lang="en-US" dirty="0" smtClean="0"/>
-              <a:t>100</a:t>
-            </a:r>
-            <a:r>
-              <a:rPr lang="en-US" dirty="0"/>
-              <a:t>, </a:t>
-            </a:r>
-            <a:r>
-              <a:rPr lang="en-US" dirty="0" err="1"/>
-              <a:t>querySize</a:t>
-            </a:r>
-            <a:r>
-              <a:rPr lang="en-US" dirty="0"/>
-              <a:t> = 10, </a:t>
-            </a:r>
-            <a:r>
-              <a:rPr lang="en-US" dirty="0" smtClean="0"/>
-              <a:t>uncertainty = </a:t>
-            </a:r>
-            <a:r>
-              <a:rPr lang="en-US" dirty="0" err="1" smtClean="0"/>
-              <a:t>voteEntropy</a:t>
-            </a:r>
-            <a:r>
-              <a:rPr lang="en-US" dirty="0" smtClean="0"/>
-              <a:t>, </a:t>
-            </a:r>
-            <a:r>
-              <a:rPr lang="en-US" dirty="0" err="1" smtClean="0"/>
-              <a:t>finalModel</a:t>
-            </a:r>
-            <a:r>
-              <a:rPr lang="en-US" dirty="0" smtClean="0"/>
-              <a:t> = Random Forests</a:t>
-            </a:r>
-            <a:endParaRPr lang="en-US" dirty="0"/>
-          </a:p>
-        </p:txBody>
-      </p:sp>
     </p:spTree>
     <p:extLst>
       <p:ext uri="{BB962C8B-B14F-4D97-AF65-F5344CB8AC3E}">

</xml_diff>